<commit_message>
Final cleanup post report submission
</commit_message>
<xml_diff>
--- a/Report/Sections/Diagrams/ADC Sine.pptx
+++ b/Report/Sections/Diagrams/ADC Sine.pptx
@@ -261,7 +261,7 @@
           <a:p>
             <a:fld id="{848A2046-5C2C-4643-83C6-CC9EB0BED69A}" type="datetimeFigureOut">
               <a:rPr lang="en-GB" smtClean="0"/>
-              <a:t>10/05/2018</a:t>
+              <a:t>14/05/2018</a:t>
             </a:fld>
             <a:endParaRPr lang="en-GB"/>
           </a:p>
@@ -461,7 +461,7 @@
           <a:p>
             <a:fld id="{848A2046-5C2C-4643-83C6-CC9EB0BED69A}" type="datetimeFigureOut">
               <a:rPr lang="en-GB" smtClean="0"/>
-              <a:t>10/05/2018</a:t>
+              <a:t>14/05/2018</a:t>
             </a:fld>
             <a:endParaRPr lang="en-GB"/>
           </a:p>
@@ -671,7 +671,7 @@
           <a:p>
             <a:fld id="{848A2046-5C2C-4643-83C6-CC9EB0BED69A}" type="datetimeFigureOut">
               <a:rPr lang="en-GB" smtClean="0"/>
-              <a:t>10/05/2018</a:t>
+              <a:t>14/05/2018</a:t>
             </a:fld>
             <a:endParaRPr lang="en-GB"/>
           </a:p>
@@ -871,7 +871,7 @@
           <a:p>
             <a:fld id="{848A2046-5C2C-4643-83C6-CC9EB0BED69A}" type="datetimeFigureOut">
               <a:rPr lang="en-GB" smtClean="0"/>
-              <a:t>10/05/2018</a:t>
+              <a:t>14/05/2018</a:t>
             </a:fld>
             <a:endParaRPr lang="en-GB"/>
           </a:p>
@@ -1147,7 +1147,7 @@
           <a:p>
             <a:fld id="{848A2046-5C2C-4643-83C6-CC9EB0BED69A}" type="datetimeFigureOut">
               <a:rPr lang="en-GB" smtClean="0"/>
-              <a:t>10/05/2018</a:t>
+              <a:t>14/05/2018</a:t>
             </a:fld>
             <a:endParaRPr lang="en-GB"/>
           </a:p>
@@ -1415,7 +1415,7 @@
           <a:p>
             <a:fld id="{848A2046-5C2C-4643-83C6-CC9EB0BED69A}" type="datetimeFigureOut">
               <a:rPr lang="en-GB" smtClean="0"/>
-              <a:t>10/05/2018</a:t>
+              <a:t>14/05/2018</a:t>
             </a:fld>
             <a:endParaRPr lang="en-GB"/>
           </a:p>
@@ -1830,7 +1830,7 @@
           <a:p>
             <a:fld id="{848A2046-5C2C-4643-83C6-CC9EB0BED69A}" type="datetimeFigureOut">
               <a:rPr lang="en-GB" smtClean="0"/>
-              <a:t>10/05/2018</a:t>
+              <a:t>14/05/2018</a:t>
             </a:fld>
             <a:endParaRPr lang="en-GB"/>
           </a:p>
@@ -1972,7 +1972,7 @@
           <a:p>
             <a:fld id="{848A2046-5C2C-4643-83C6-CC9EB0BED69A}" type="datetimeFigureOut">
               <a:rPr lang="en-GB" smtClean="0"/>
-              <a:t>10/05/2018</a:t>
+              <a:t>14/05/2018</a:t>
             </a:fld>
             <a:endParaRPr lang="en-GB"/>
           </a:p>
@@ -2085,7 +2085,7 @@
           <a:p>
             <a:fld id="{848A2046-5C2C-4643-83C6-CC9EB0BED69A}" type="datetimeFigureOut">
               <a:rPr lang="en-GB" smtClean="0"/>
-              <a:t>10/05/2018</a:t>
+              <a:t>14/05/2018</a:t>
             </a:fld>
             <a:endParaRPr lang="en-GB"/>
           </a:p>
@@ -2398,7 +2398,7 @@
           <a:p>
             <a:fld id="{848A2046-5C2C-4643-83C6-CC9EB0BED69A}" type="datetimeFigureOut">
               <a:rPr lang="en-GB" smtClean="0"/>
-              <a:t>10/05/2018</a:t>
+              <a:t>14/05/2018</a:t>
             </a:fld>
             <a:endParaRPr lang="en-GB"/>
           </a:p>
@@ -2687,7 +2687,7 @@
           <a:p>
             <a:fld id="{848A2046-5C2C-4643-83C6-CC9EB0BED69A}" type="datetimeFigureOut">
               <a:rPr lang="en-GB" smtClean="0"/>
-              <a:t>10/05/2018</a:t>
+              <a:t>14/05/2018</a:t>
             </a:fld>
             <a:endParaRPr lang="en-GB"/>
           </a:p>
@@ -2930,7 +2930,7 @@
           <a:p>
             <a:fld id="{848A2046-5C2C-4643-83C6-CC9EB0BED69A}" type="datetimeFigureOut">
               <a:rPr lang="en-GB" smtClean="0"/>
-              <a:t>10/05/2018</a:t>
+              <a:t>14/05/2018</a:t>
             </a:fld>
             <a:endParaRPr lang="en-GB"/>
           </a:p>
@@ -3349,10 +3349,10 @@
       </p:grpSpPr>
       <p:grpSp>
         <p:nvGrpSpPr>
-          <p:cNvPr id="3" name="Group 2">
-            <a:extLst>
-              <a:ext uri="{FF2B5EF4-FFF2-40B4-BE49-F238E27FC236}">
-                <a16:creationId xmlns:a16="http://schemas.microsoft.com/office/drawing/2014/main" id="{77DB9207-003E-432F-B5A7-7A3F850C3B58}"/>
+          <p:cNvPr id="9" name="Group 8">
+            <a:extLst>
+              <a:ext uri="{FF2B5EF4-FFF2-40B4-BE49-F238E27FC236}">
+                <a16:creationId xmlns:a16="http://schemas.microsoft.com/office/drawing/2014/main" id="{052362F3-0A47-4AA8-B478-668D031B1457}"/>
               </a:ext>
             </a:extLst>
           </p:cNvPr>
@@ -3369,10 +3369,10 @@
         </p:grpSpPr>
         <p:grpSp>
           <p:nvGrpSpPr>
-            <p:cNvPr id="12" name="Group 11">
+            <p:cNvPr id="3" name="Group 2">
               <a:extLst>
                 <a:ext uri="{FF2B5EF4-FFF2-40B4-BE49-F238E27FC236}">
-                  <a16:creationId xmlns:a16="http://schemas.microsoft.com/office/drawing/2014/main" id="{9A4DB27E-C5E9-4A57-9403-049363106C13}"/>
+                  <a16:creationId xmlns:a16="http://schemas.microsoft.com/office/drawing/2014/main" id="{77DB9207-003E-432F-B5A7-7A3F850C3B58}"/>
                 </a:ext>
               </a:extLst>
             </p:cNvPr>
@@ -3381,28 +3381,626 @@
           </p:nvGrpSpPr>
           <p:grpSpPr>
             <a:xfrm>
-              <a:off x="3274422" y="1567543"/>
-              <a:ext cx="5320937" cy="3950216"/>
-              <a:chOff x="3274422" y="1567543"/>
-              <a:chExt cx="5320937" cy="3950216"/>
+              <a:off x="3265712" y="1567543"/>
+              <a:ext cx="5329647" cy="3950216"/>
+              <a:chOff x="3265712" y="1567543"/>
+              <a:chExt cx="5329647" cy="3950216"/>
             </a:xfrm>
           </p:grpSpPr>
-          <p:sp>
-            <p:nvSpPr>
-              <p:cNvPr id="6" name="Rectangle 5">
+          <p:grpSp>
+            <p:nvGrpSpPr>
+              <p:cNvPr id="12" name="Group 11">
                 <a:extLst>
                   <a:ext uri="{FF2B5EF4-FFF2-40B4-BE49-F238E27FC236}">
-                    <a16:creationId xmlns:a16="http://schemas.microsoft.com/office/drawing/2014/main" id="{DDDF4829-314E-4BBA-9CDA-3F19C171DA57}"/>
+                    <a16:creationId xmlns:a16="http://schemas.microsoft.com/office/drawing/2014/main" id="{9A4DB27E-C5E9-4A57-9403-049363106C13}"/>
                   </a:ext>
                 </a:extLst>
               </p:cNvPr>
-              <p:cNvSpPr/>
+              <p:cNvGrpSpPr/>
+              <p:nvPr/>
+            </p:nvGrpSpPr>
+            <p:grpSpPr>
+              <a:xfrm>
+                <a:off x="3274422" y="1567543"/>
+                <a:ext cx="5320937" cy="3950216"/>
+                <a:chOff x="3274422" y="1567543"/>
+                <a:chExt cx="5320937" cy="3950216"/>
+              </a:xfrm>
+            </p:grpSpPr>
+            <p:sp>
+              <p:nvSpPr>
+                <p:cNvPr id="6" name="Rectangle 5">
+                  <a:extLst>
+                    <a:ext uri="{FF2B5EF4-FFF2-40B4-BE49-F238E27FC236}">
+                      <a16:creationId xmlns:a16="http://schemas.microsoft.com/office/drawing/2014/main" id="{DDDF4829-314E-4BBA-9CDA-3F19C171DA57}"/>
+                    </a:ext>
+                  </a:extLst>
+                </p:cNvPr>
+                <p:cNvSpPr/>
+                <p:nvPr/>
+              </p:nvSpPr>
+              <p:spPr>
+                <a:xfrm>
+                  <a:off x="3274422" y="1567543"/>
+                  <a:ext cx="5320937" cy="3950216"/>
+                </a:xfrm>
+                <a:prstGeom prst="rect">
+                  <a:avLst/>
+                </a:prstGeom>
+                <a:solidFill>
+                  <a:schemeClr val="bg1"/>
+                </a:solidFill>
+                <a:ln>
+                  <a:solidFill>
+                    <a:schemeClr val="bg1"/>
+                  </a:solidFill>
+                </a:ln>
+              </p:spPr>
+              <p:style>
+                <a:lnRef idx="2">
+                  <a:schemeClr val="accent1">
+                    <a:shade val="50000"/>
+                  </a:schemeClr>
+                </a:lnRef>
+                <a:fillRef idx="1">
+                  <a:schemeClr val="accent1"/>
+                </a:fillRef>
+                <a:effectRef idx="0">
+                  <a:schemeClr val="accent1"/>
+                </a:effectRef>
+                <a:fontRef idx="minor">
+                  <a:schemeClr val="lt1"/>
+                </a:fontRef>
+              </p:style>
+              <p:txBody>
+                <a:bodyPr rtlCol="0" anchor="ctr"/>
+                <a:lstStyle/>
+                <a:p>
+                  <a:pPr algn="ctr"/>
+                  <a:endParaRPr lang="en-GB"/>
+                </a:p>
+              </p:txBody>
+            </p:sp>
+            <p:pic>
+              <p:nvPicPr>
+                <p:cNvPr id="1026" name="Picture 2" descr="Image result for sin(x)">
+                  <a:extLst>
+                    <a:ext uri="{FF2B5EF4-FFF2-40B4-BE49-F238E27FC236}">
+                      <a16:creationId xmlns:a16="http://schemas.microsoft.com/office/drawing/2014/main" id="{23DABEBE-D82F-4A7C-A1D8-79A8FB7583B5}"/>
+                    </a:ext>
+                  </a:extLst>
+                </p:cNvPr>
+                <p:cNvPicPr>
+                  <a:picLocks noChangeAspect="1" noChangeArrowheads="1"/>
+                </p:cNvPicPr>
+                <p:nvPr/>
+              </p:nvPicPr>
+              <p:blipFill rotWithShape="1">
+                <a:blip r:embed="rId2">
+                  <a:clrChange>
+                    <a:clrFrom>
+                      <a:srgbClr val="FFFFFF"/>
+                    </a:clrFrom>
+                    <a:clrTo>
+                      <a:srgbClr val="FFFFFF">
+                        <a:alpha val="0"/>
+                      </a:srgbClr>
+                    </a:clrTo>
+                  </a:clrChange>
+                  <a:extLst>
+                    <a:ext uri="{28A0092B-C50C-407E-A947-70E740481C1C}">
+                      <a14:useLocalDpi xmlns:a14="http://schemas.microsoft.com/office/drawing/2010/main" val="0"/>
+                    </a:ext>
+                  </a:extLst>
+                </a:blip>
+                <a:srcRect l="22955" t="16747" r="7559" b="7285"/>
+                <a:stretch/>
+              </p:blipFill>
+              <p:spPr bwMode="auto">
+                <a:xfrm>
+                  <a:off x="5451566" y="1976847"/>
+                  <a:ext cx="1663337" cy="2917371"/>
+                </a:xfrm>
+                <a:prstGeom prst="rect">
+                  <a:avLst/>
+                </a:prstGeom>
+                <a:noFill/>
+                <a:extLst>
+                  <a:ext uri="{909E8E84-426E-40DD-AFC4-6F175D3DCCD1}">
+                    <a14:hiddenFill xmlns:a14="http://schemas.microsoft.com/office/drawing/2010/main">
+                      <a:solidFill>
+                        <a:srgbClr val="FFFFFF"/>
+                      </a:solidFill>
+                    </a14:hiddenFill>
+                  </a:ext>
+                </a:extLst>
+              </p:spPr>
+            </p:pic>
+            <p:pic>
+              <p:nvPicPr>
+                <p:cNvPr id="7" name="Picture 2" descr="Image result for sin(x)">
+                  <a:extLst>
+                    <a:ext uri="{FF2B5EF4-FFF2-40B4-BE49-F238E27FC236}">
+                      <a16:creationId xmlns:a16="http://schemas.microsoft.com/office/drawing/2014/main" id="{79268A8B-407E-41EF-855C-06198CDE73FF}"/>
+                    </a:ext>
+                  </a:extLst>
+                </p:cNvPr>
+                <p:cNvPicPr>
+                  <a:picLocks noChangeAspect="1" noChangeArrowheads="1"/>
+                </p:cNvPicPr>
+                <p:nvPr/>
+              </p:nvPicPr>
+              <p:blipFill rotWithShape="1">
+                <a:blip r:embed="rId2">
+                  <a:clrChange>
+                    <a:clrFrom>
+                      <a:srgbClr val="FFFFFF"/>
+                    </a:clrFrom>
+                    <a:clrTo>
+                      <a:srgbClr val="FFFFFF">
+                        <a:alpha val="0"/>
+                      </a:srgbClr>
+                    </a:clrTo>
+                  </a:clrChange>
+                  <a:extLst>
+                    <a:ext uri="{28A0092B-C50C-407E-A947-70E740481C1C}">
+                      <a14:useLocalDpi xmlns:a14="http://schemas.microsoft.com/office/drawing/2010/main" val="0"/>
+                    </a:ext>
+                  </a:extLst>
+                </a:blip>
+                <a:srcRect l="35870" t="16747" r="7559" b="7285"/>
+                <a:stretch/>
+              </p:blipFill>
+              <p:spPr bwMode="auto">
+                <a:xfrm>
+                  <a:off x="4119154" y="1976847"/>
+                  <a:ext cx="1354180" cy="2917371"/>
+                </a:xfrm>
+                <a:prstGeom prst="rect">
+                  <a:avLst/>
+                </a:prstGeom>
+                <a:noFill/>
+                <a:extLst>
+                  <a:ext uri="{909E8E84-426E-40DD-AFC4-6F175D3DCCD1}">
+                    <a14:hiddenFill xmlns:a14="http://schemas.microsoft.com/office/drawing/2010/main">
+                      <a:solidFill>
+                        <a:srgbClr val="FFFFFF"/>
+                      </a:solidFill>
+                    </a14:hiddenFill>
+                  </a:ext>
+                </a:extLst>
+              </p:spPr>
+            </p:pic>
+            <p:pic>
+              <p:nvPicPr>
+                <p:cNvPr id="8" name="Picture 2" descr="Image result for sin(x)">
+                  <a:extLst>
+                    <a:ext uri="{FF2B5EF4-FFF2-40B4-BE49-F238E27FC236}">
+                      <a16:creationId xmlns:a16="http://schemas.microsoft.com/office/drawing/2014/main" id="{92F30DB4-41E2-4676-93CE-C85C14EBCAB2}"/>
+                    </a:ext>
+                  </a:extLst>
+                </p:cNvPr>
+                <p:cNvPicPr>
+                  <a:picLocks noChangeAspect="1" noChangeArrowheads="1"/>
+                </p:cNvPicPr>
+                <p:nvPr/>
+              </p:nvPicPr>
+              <p:blipFill rotWithShape="1">
+                <a:blip r:embed="rId2">
+                  <a:clrChange>
+                    <a:clrFrom>
+                      <a:srgbClr val="FFFFFF"/>
+                    </a:clrFrom>
+                    <a:clrTo>
+                      <a:srgbClr val="FFFFFF">
+                        <a:alpha val="0"/>
+                      </a:srgbClr>
+                    </a:clrTo>
+                  </a:clrChange>
+                  <a:extLst>
+                    <a:ext uri="{28A0092B-C50C-407E-A947-70E740481C1C}">
+                      <a14:useLocalDpi xmlns:a14="http://schemas.microsoft.com/office/drawing/2010/main" val="0"/>
+                    </a:ext>
+                  </a:extLst>
+                </a:blip>
+                <a:srcRect l="22956" t="16747" r="30478" b="7285"/>
+                <a:stretch/>
+              </p:blipFill>
+              <p:spPr bwMode="auto">
+                <a:xfrm>
+                  <a:off x="7106193" y="1976847"/>
+                  <a:ext cx="1114698" cy="2917371"/>
+                </a:xfrm>
+                <a:prstGeom prst="rect">
+                  <a:avLst/>
+                </a:prstGeom>
+                <a:noFill/>
+                <a:extLst>
+                  <a:ext uri="{909E8E84-426E-40DD-AFC4-6F175D3DCCD1}">
+                    <a14:hiddenFill xmlns:a14="http://schemas.microsoft.com/office/drawing/2010/main">
+                      <a:solidFill>
+                        <a:srgbClr val="FFFFFF"/>
+                      </a:solidFill>
+                    </a14:hiddenFill>
+                  </a:ext>
+                </a:extLst>
+              </p:spPr>
+            </p:pic>
+            <p:cxnSp>
+              <p:nvCxnSpPr>
+                <p:cNvPr id="10" name="Straight Connector 9">
+                  <a:extLst>
+                    <a:ext uri="{FF2B5EF4-FFF2-40B4-BE49-F238E27FC236}">
+                      <a16:creationId xmlns:a16="http://schemas.microsoft.com/office/drawing/2014/main" id="{151F53A0-B781-43B4-AACC-D3BE1BE8162D}"/>
+                    </a:ext>
+                  </a:extLst>
+                </p:cNvPr>
+                <p:cNvCxnSpPr>
+                  <a:cxnSpLocks/>
+                </p:cNvCxnSpPr>
+                <p:nvPr/>
+              </p:nvCxnSpPr>
+              <p:spPr>
+                <a:xfrm>
+                  <a:off x="4119154" y="3437705"/>
+                  <a:ext cx="4101737" cy="6533"/>
+                </a:xfrm>
+                <a:prstGeom prst="line">
+                  <a:avLst/>
+                </a:prstGeom>
+                <a:ln w="57150">
+                  <a:solidFill>
+                    <a:schemeClr val="bg1"/>
+                  </a:solidFill>
+                </a:ln>
+              </p:spPr>
+              <p:style>
+                <a:lnRef idx="1">
+                  <a:schemeClr val="accent1"/>
+                </a:lnRef>
+                <a:fillRef idx="0">
+                  <a:schemeClr val="accent1"/>
+                </a:fillRef>
+                <a:effectRef idx="0">
+                  <a:schemeClr val="accent1"/>
+                </a:effectRef>
+                <a:fontRef idx="minor">
+                  <a:schemeClr val="tx1"/>
+                </a:fontRef>
+              </p:style>
+            </p:cxnSp>
+            <p:sp>
+              <p:nvSpPr>
+                <p:cNvPr id="11" name="Rectangle 10">
+                  <a:extLst>
+                    <a:ext uri="{FF2B5EF4-FFF2-40B4-BE49-F238E27FC236}">
+                      <a16:creationId xmlns:a16="http://schemas.microsoft.com/office/drawing/2014/main" id="{1444ACC0-7BA2-455F-A151-B168A5EAF6AA}"/>
+                    </a:ext>
+                  </a:extLst>
+                </p:cNvPr>
+                <p:cNvSpPr/>
+                <p:nvPr/>
+              </p:nvSpPr>
+              <p:spPr>
+                <a:xfrm>
+                  <a:off x="4110445" y="3505201"/>
+                  <a:ext cx="522515" cy="291727"/>
+                </a:xfrm>
+                <a:prstGeom prst="rect">
+                  <a:avLst/>
+                </a:prstGeom>
+                <a:solidFill>
+                  <a:schemeClr val="bg1"/>
+                </a:solidFill>
+                <a:ln>
+                  <a:solidFill>
+                    <a:schemeClr val="bg1"/>
+                  </a:solidFill>
+                </a:ln>
+              </p:spPr>
+              <p:style>
+                <a:lnRef idx="2">
+                  <a:schemeClr val="accent1">
+                    <a:shade val="50000"/>
+                  </a:schemeClr>
+                </a:lnRef>
+                <a:fillRef idx="1">
+                  <a:schemeClr val="accent1"/>
+                </a:fillRef>
+                <a:effectRef idx="0">
+                  <a:schemeClr val="accent1"/>
+                </a:effectRef>
+                <a:fontRef idx="minor">
+                  <a:schemeClr val="lt1"/>
+                </a:fontRef>
+              </p:style>
+              <p:txBody>
+                <a:bodyPr rtlCol="0" anchor="ctr"/>
+                <a:lstStyle/>
+                <a:p>
+                  <a:pPr algn="ctr"/>
+                  <a:endParaRPr lang="en-GB"/>
+                </a:p>
+              </p:txBody>
+            </p:sp>
+            <p:sp>
+              <p:nvSpPr>
+                <p:cNvPr id="13" name="Rectangle 12">
+                  <a:extLst>
+                    <a:ext uri="{FF2B5EF4-FFF2-40B4-BE49-F238E27FC236}">
+                      <a16:creationId xmlns:a16="http://schemas.microsoft.com/office/drawing/2014/main" id="{7CD759DA-C21A-49B3-A4A9-F6BE8AB2314F}"/>
+                    </a:ext>
+                  </a:extLst>
+                </p:cNvPr>
+                <p:cNvSpPr/>
+                <p:nvPr/>
+              </p:nvSpPr>
+              <p:spPr>
+                <a:xfrm>
+                  <a:off x="4767943" y="3435532"/>
+                  <a:ext cx="522515" cy="291727"/>
+                </a:xfrm>
+                <a:prstGeom prst="rect">
+                  <a:avLst/>
+                </a:prstGeom>
+                <a:solidFill>
+                  <a:schemeClr val="bg1"/>
+                </a:solidFill>
+                <a:ln>
+                  <a:solidFill>
+                    <a:schemeClr val="bg1"/>
+                  </a:solidFill>
+                </a:ln>
+              </p:spPr>
+              <p:style>
+                <a:lnRef idx="2">
+                  <a:schemeClr val="accent1">
+                    <a:shade val="50000"/>
+                  </a:schemeClr>
+                </a:lnRef>
+                <a:fillRef idx="1">
+                  <a:schemeClr val="accent1"/>
+                </a:fillRef>
+                <a:effectRef idx="0">
+                  <a:schemeClr val="accent1"/>
+                </a:effectRef>
+                <a:fontRef idx="minor">
+                  <a:schemeClr val="lt1"/>
+                </a:fontRef>
+              </p:style>
+              <p:txBody>
+                <a:bodyPr rtlCol="0" anchor="ctr"/>
+                <a:lstStyle/>
+                <a:p>
+                  <a:pPr algn="ctr"/>
+                  <a:endParaRPr lang="en-GB"/>
+                </a:p>
+              </p:txBody>
+            </p:sp>
+            <p:sp>
+              <p:nvSpPr>
+                <p:cNvPr id="14" name="Rectangle 13">
+                  <a:extLst>
+                    <a:ext uri="{FF2B5EF4-FFF2-40B4-BE49-F238E27FC236}">
+                      <a16:creationId xmlns:a16="http://schemas.microsoft.com/office/drawing/2014/main" id="{C8E485B1-75D3-4FE0-8065-758DE1DEDE6D}"/>
+                    </a:ext>
+                  </a:extLst>
+                </p:cNvPr>
+                <p:cNvSpPr/>
+                <p:nvPr/>
+              </p:nvSpPr>
+              <p:spPr>
+                <a:xfrm>
+                  <a:off x="5756370" y="3496492"/>
+                  <a:ext cx="522515" cy="291727"/>
+                </a:xfrm>
+                <a:prstGeom prst="rect">
+                  <a:avLst/>
+                </a:prstGeom>
+                <a:solidFill>
+                  <a:schemeClr val="bg1"/>
+                </a:solidFill>
+                <a:ln>
+                  <a:solidFill>
+                    <a:schemeClr val="bg1"/>
+                  </a:solidFill>
+                </a:ln>
+              </p:spPr>
+              <p:style>
+                <a:lnRef idx="2">
+                  <a:schemeClr val="accent1">
+                    <a:shade val="50000"/>
+                  </a:schemeClr>
+                </a:lnRef>
+                <a:fillRef idx="1">
+                  <a:schemeClr val="accent1"/>
+                </a:fillRef>
+                <a:effectRef idx="0">
+                  <a:schemeClr val="accent1"/>
+                </a:effectRef>
+                <a:fontRef idx="minor">
+                  <a:schemeClr val="lt1"/>
+                </a:fontRef>
+              </p:style>
+              <p:txBody>
+                <a:bodyPr rtlCol="0" anchor="ctr"/>
+                <a:lstStyle/>
+                <a:p>
+                  <a:pPr algn="ctr"/>
+                  <a:endParaRPr lang="en-GB"/>
+                </a:p>
+              </p:txBody>
+            </p:sp>
+            <p:sp>
+              <p:nvSpPr>
+                <p:cNvPr id="15" name="Rectangle 14">
+                  <a:extLst>
+                    <a:ext uri="{FF2B5EF4-FFF2-40B4-BE49-F238E27FC236}">
+                      <a16:creationId xmlns:a16="http://schemas.microsoft.com/office/drawing/2014/main" id="{05C08EDC-C57D-44DD-B1A7-EE11718AC77A}"/>
+                    </a:ext>
+                  </a:extLst>
+                </p:cNvPr>
+                <p:cNvSpPr/>
+                <p:nvPr/>
+              </p:nvSpPr>
+              <p:spPr>
+                <a:xfrm>
+                  <a:off x="6400802" y="3464281"/>
+                  <a:ext cx="522515" cy="291727"/>
+                </a:xfrm>
+                <a:prstGeom prst="rect">
+                  <a:avLst/>
+                </a:prstGeom>
+                <a:solidFill>
+                  <a:schemeClr val="bg1"/>
+                </a:solidFill>
+                <a:ln>
+                  <a:solidFill>
+                    <a:schemeClr val="bg1"/>
+                  </a:solidFill>
+                </a:ln>
+              </p:spPr>
+              <p:style>
+                <a:lnRef idx="2">
+                  <a:schemeClr val="accent1">
+                    <a:shade val="50000"/>
+                  </a:schemeClr>
+                </a:lnRef>
+                <a:fillRef idx="1">
+                  <a:schemeClr val="accent1"/>
+                </a:fillRef>
+                <a:effectRef idx="0">
+                  <a:schemeClr val="accent1"/>
+                </a:effectRef>
+                <a:fontRef idx="minor">
+                  <a:schemeClr val="lt1"/>
+                </a:fontRef>
+              </p:style>
+              <p:txBody>
+                <a:bodyPr rtlCol="0" anchor="ctr"/>
+                <a:lstStyle/>
+                <a:p>
+                  <a:pPr algn="ctr"/>
+                  <a:endParaRPr lang="en-GB"/>
+                </a:p>
+              </p:txBody>
+            </p:sp>
+            <p:sp>
+              <p:nvSpPr>
+                <p:cNvPr id="16" name="Rectangle 15">
+                  <a:extLst>
+                    <a:ext uri="{FF2B5EF4-FFF2-40B4-BE49-F238E27FC236}">
+                      <a16:creationId xmlns:a16="http://schemas.microsoft.com/office/drawing/2014/main" id="{C9134C46-8FC3-4A74-AC9E-014948595F05}"/>
+                    </a:ext>
+                  </a:extLst>
+                </p:cNvPr>
+                <p:cNvSpPr/>
+                <p:nvPr/>
+              </p:nvSpPr>
+              <p:spPr>
+                <a:xfrm>
+                  <a:off x="7415352" y="3503464"/>
+                  <a:ext cx="522515" cy="291727"/>
+                </a:xfrm>
+                <a:prstGeom prst="rect">
+                  <a:avLst/>
+                </a:prstGeom>
+                <a:solidFill>
+                  <a:schemeClr val="bg1"/>
+                </a:solidFill>
+                <a:ln>
+                  <a:solidFill>
+                    <a:schemeClr val="bg1"/>
+                  </a:solidFill>
+                </a:ln>
+              </p:spPr>
+              <p:style>
+                <a:lnRef idx="2">
+                  <a:schemeClr val="accent1">
+                    <a:shade val="50000"/>
+                  </a:schemeClr>
+                </a:lnRef>
+                <a:fillRef idx="1">
+                  <a:schemeClr val="accent1"/>
+                </a:fillRef>
+                <a:effectRef idx="0">
+                  <a:schemeClr val="accent1"/>
+                </a:effectRef>
+                <a:fontRef idx="minor">
+                  <a:schemeClr val="lt1"/>
+                </a:fontRef>
+              </p:style>
+              <p:txBody>
+                <a:bodyPr rtlCol="0" anchor="ctr"/>
+                <a:lstStyle/>
+                <a:p>
+                  <a:pPr algn="ctr"/>
+                  <a:endParaRPr lang="en-GB"/>
+                </a:p>
+              </p:txBody>
+            </p:sp>
+            <p:pic>
+              <p:nvPicPr>
+                <p:cNvPr id="5" name="Picture 4">
+                  <a:extLst>
+                    <a:ext uri="{FF2B5EF4-FFF2-40B4-BE49-F238E27FC236}">
+                      <a16:creationId xmlns:a16="http://schemas.microsoft.com/office/drawing/2014/main" id="{EE79E09A-1849-432A-A96D-BA47AE8D76C2}"/>
+                    </a:ext>
+                  </a:extLst>
+                </p:cNvPr>
+                <p:cNvPicPr>
+                  <a:picLocks noChangeAspect="1"/>
+                </p:cNvPicPr>
+                <p:nvPr/>
+              </p:nvPicPr>
+              <p:blipFill rotWithShape="1">
+                <a:blip r:embed="rId3">
+                  <a:clrChange>
+                    <a:clrFrom>
+                      <a:srgbClr val="FFFFFF"/>
+                    </a:clrFrom>
+                    <a:clrTo>
+                      <a:srgbClr val="FFFFFF">
+                        <a:alpha val="0"/>
+                      </a:srgbClr>
+                    </a:clrTo>
+                  </a:clrChange>
+                  <a:extLst>
+                    <a:ext uri="{28A0092B-C50C-407E-A947-70E740481C1C}">
+                      <a14:useLocalDpi xmlns:a14="http://schemas.microsoft.com/office/drawing/2010/main" val="0"/>
+                    </a:ext>
+                  </a:extLst>
+                </a:blip>
+                <a:srcRect l="3125" t="2877" r="9078"/>
+                <a:stretch/>
+              </p:blipFill>
+              <p:spPr>
+                <a:xfrm>
+                  <a:off x="3357155" y="1567543"/>
+                  <a:ext cx="5138051" cy="3836565"/>
+                </a:xfrm>
+                <a:prstGeom prst="rect">
+                  <a:avLst/>
+                </a:prstGeom>
+              </p:spPr>
+            </p:pic>
+          </p:grpSp>
+          <p:sp>
+            <p:nvSpPr>
+              <p:cNvPr id="2" name="TextBox 1">
+                <a:extLst>
+                  <a:ext uri="{FF2B5EF4-FFF2-40B4-BE49-F238E27FC236}">
+                    <a16:creationId xmlns:a16="http://schemas.microsoft.com/office/drawing/2014/main" id="{E7807BD8-9D4C-4860-B879-3701AC664545}"/>
+                  </a:ext>
+                </a:extLst>
+              </p:cNvPr>
+              <p:cNvSpPr txBox="1"/>
               <p:nvPr/>
             </p:nvSpPr>
             <p:spPr>
               <a:xfrm>
-                <a:off x="3274422" y="1567543"/>
-                <a:ext cx="5320937" cy="3950216"/>
+                <a:off x="5331825" y="5173859"/>
+                <a:ext cx="1591492" cy="307777"/>
               </a:xfrm>
               <a:prstGeom prst="rect">
                 <a:avLst/>
@@ -3410,261 +4008,42 @@
               <a:solidFill>
                 <a:schemeClr val="bg1"/>
               </a:solidFill>
-              <a:ln>
-                <a:solidFill>
-                  <a:schemeClr val="bg1"/>
-                </a:solidFill>
-              </a:ln>
             </p:spPr>
-            <p:style>
-              <a:lnRef idx="2">
-                <a:schemeClr val="accent1">
-                  <a:shade val="50000"/>
-                </a:schemeClr>
-              </a:lnRef>
-              <a:fillRef idx="1">
-                <a:schemeClr val="accent1"/>
-              </a:fillRef>
-              <a:effectRef idx="0">
-                <a:schemeClr val="accent1"/>
-              </a:effectRef>
-              <a:fontRef idx="minor">
-                <a:schemeClr val="lt1"/>
-              </a:fontRef>
-            </p:style>
             <p:txBody>
-              <a:bodyPr rtlCol="0" anchor="ctr"/>
+              <a:bodyPr wrap="square" rtlCol="0">
+                <a:spAutoFit/>
+              </a:bodyPr>
               <a:lstStyle/>
               <a:p>
-                <a:pPr algn="ctr"/>
-                <a:endParaRPr lang="en-GB"/>
+                <a:r>
+                  <a:rPr lang="en-GB" sz="1400" dirty="0">
+                    <a:solidFill>
+                      <a:schemeClr val="bg2">
+                        <a:lumMod val="25000"/>
+                      </a:schemeClr>
+                    </a:solidFill>
+                  </a:rPr>
+                  <a:t>Samples at 10KSPS</a:t>
+                </a:r>
               </a:p>
             </p:txBody>
           </p:sp>
-          <p:pic>
-            <p:nvPicPr>
-              <p:cNvPr id="1026" name="Picture 2" descr="Image result for sin(x)">
+          <p:sp>
+            <p:nvSpPr>
+              <p:cNvPr id="17" name="TextBox 16">
                 <a:extLst>
                   <a:ext uri="{FF2B5EF4-FFF2-40B4-BE49-F238E27FC236}">
-                    <a16:creationId xmlns:a16="http://schemas.microsoft.com/office/drawing/2014/main" id="{23DABEBE-D82F-4A7C-A1D8-79A8FB7583B5}"/>
+                    <a16:creationId xmlns:a16="http://schemas.microsoft.com/office/drawing/2014/main" id="{28CE9633-2247-4082-97FA-AEA0FF66AE46}"/>
                   </a:ext>
                 </a:extLst>
               </p:cNvPr>
-              <p:cNvPicPr>
-                <a:picLocks noChangeAspect="1" noChangeArrowheads="1"/>
-              </p:cNvPicPr>
-              <p:nvPr/>
-            </p:nvPicPr>
-            <p:blipFill rotWithShape="1">
-              <a:blip r:embed="rId2">
-                <a:clrChange>
-                  <a:clrFrom>
-                    <a:srgbClr val="FFFFFF"/>
-                  </a:clrFrom>
-                  <a:clrTo>
-                    <a:srgbClr val="FFFFFF">
-                      <a:alpha val="0"/>
-                    </a:srgbClr>
-                  </a:clrTo>
-                </a:clrChange>
-                <a:extLst>
-                  <a:ext uri="{28A0092B-C50C-407E-A947-70E740481C1C}">
-                    <a14:useLocalDpi xmlns:a14="http://schemas.microsoft.com/office/drawing/2010/main" val="0"/>
-                  </a:ext>
-                </a:extLst>
-              </a:blip>
-              <a:srcRect l="22955" t="16747" r="7559" b="7285"/>
-              <a:stretch/>
-            </p:blipFill>
-            <p:spPr bwMode="auto">
-              <a:xfrm>
-                <a:off x="5451566" y="1976847"/>
-                <a:ext cx="1663337" cy="2917371"/>
-              </a:xfrm>
-              <a:prstGeom prst="rect">
-                <a:avLst/>
-              </a:prstGeom>
-              <a:noFill/>
-              <a:extLst>
-                <a:ext uri="{909E8E84-426E-40DD-AFC4-6F175D3DCCD1}">
-                  <a14:hiddenFill xmlns:a14="http://schemas.microsoft.com/office/drawing/2010/main">
-                    <a:solidFill>
-                      <a:srgbClr val="FFFFFF"/>
-                    </a:solidFill>
-                  </a14:hiddenFill>
-                </a:ext>
-              </a:extLst>
-            </p:spPr>
-          </p:pic>
-          <p:pic>
-            <p:nvPicPr>
-              <p:cNvPr id="7" name="Picture 2" descr="Image result for sin(x)">
-                <a:extLst>
-                  <a:ext uri="{FF2B5EF4-FFF2-40B4-BE49-F238E27FC236}">
-                    <a16:creationId xmlns:a16="http://schemas.microsoft.com/office/drawing/2014/main" id="{79268A8B-407E-41EF-855C-06198CDE73FF}"/>
-                  </a:ext>
-                </a:extLst>
-              </p:cNvPr>
-              <p:cNvPicPr>
-                <a:picLocks noChangeAspect="1" noChangeArrowheads="1"/>
-              </p:cNvPicPr>
-              <p:nvPr/>
-            </p:nvPicPr>
-            <p:blipFill rotWithShape="1">
-              <a:blip r:embed="rId2">
-                <a:clrChange>
-                  <a:clrFrom>
-                    <a:srgbClr val="FFFFFF"/>
-                  </a:clrFrom>
-                  <a:clrTo>
-                    <a:srgbClr val="FFFFFF">
-                      <a:alpha val="0"/>
-                    </a:srgbClr>
-                  </a:clrTo>
-                </a:clrChange>
-                <a:extLst>
-                  <a:ext uri="{28A0092B-C50C-407E-A947-70E740481C1C}">
-                    <a14:useLocalDpi xmlns:a14="http://schemas.microsoft.com/office/drawing/2010/main" val="0"/>
-                  </a:ext>
-                </a:extLst>
-              </a:blip>
-              <a:srcRect l="35870" t="16747" r="7559" b="7285"/>
-              <a:stretch/>
-            </p:blipFill>
-            <p:spPr bwMode="auto">
-              <a:xfrm>
-                <a:off x="4119154" y="1976847"/>
-                <a:ext cx="1354180" cy="2917371"/>
-              </a:xfrm>
-              <a:prstGeom prst="rect">
-                <a:avLst/>
-              </a:prstGeom>
-              <a:noFill/>
-              <a:extLst>
-                <a:ext uri="{909E8E84-426E-40DD-AFC4-6F175D3DCCD1}">
-                  <a14:hiddenFill xmlns:a14="http://schemas.microsoft.com/office/drawing/2010/main">
-                    <a:solidFill>
-                      <a:srgbClr val="FFFFFF"/>
-                    </a:solidFill>
-                  </a14:hiddenFill>
-                </a:ext>
-              </a:extLst>
-            </p:spPr>
-          </p:pic>
-          <p:pic>
-            <p:nvPicPr>
-              <p:cNvPr id="8" name="Picture 2" descr="Image result for sin(x)">
-                <a:extLst>
-                  <a:ext uri="{FF2B5EF4-FFF2-40B4-BE49-F238E27FC236}">
-                    <a16:creationId xmlns:a16="http://schemas.microsoft.com/office/drawing/2014/main" id="{92F30DB4-41E2-4676-93CE-C85C14EBCAB2}"/>
-                  </a:ext>
-                </a:extLst>
-              </p:cNvPr>
-              <p:cNvPicPr>
-                <a:picLocks noChangeAspect="1" noChangeArrowheads="1"/>
-              </p:cNvPicPr>
-              <p:nvPr/>
-            </p:nvPicPr>
-            <p:blipFill rotWithShape="1">
-              <a:blip r:embed="rId2">
-                <a:clrChange>
-                  <a:clrFrom>
-                    <a:srgbClr val="FFFFFF"/>
-                  </a:clrFrom>
-                  <a:clrTo>
-                    <a:srgbClr val="FFFFFF">
-                      <a:alpha val="0"/>
-                    </a:srgbClr>
-                  </a:clrTo>
-                </a:clrChange>
-                <a:extLst>
-                  <a:ext uri="{28A0092B-C50C-407E-A947-70E740481C1C}">
-                    <a14:useLocalDpi xmlns:a14="http://schemas.microsoft.com/office/drawing/2010/main" val="0"/>
-                  </a:ext>
-                </a:extLst>
-              </a:blip>
-              <a:srcRect l="22956" t="16747" r="30478" b="7285"/>
-              <a:stretch/>
-            </p:blipFill>
-            <p:spPr bwMode="auto">
-              <a:xfrm>
-                <a:off x="7106193" y="1976847"/>
-                <a:ext cx="1114698" cy="2917371"/>
-              </a:xfrm>
-              <a:prstGeom prst="rect">
-                <a:avLst/>
-              </a:prstGeom>
-              <a:noFill/>
-              <a:extLst>
-                <a:ext uri="{909E8E84-426E-40DD-AFC4-6F175D3DCCD1}">
-                  <a14:hiddenFill xmlns:a14="http://schemas.microsoft.com/office/drawing/2010/main">
-                    <a:solidFill>
-                      <a:srgbClr val="FFFFFF"/>
-                    </a:solidFill>
-                  </a14:hiddenFill>
-                </a:ext>
-              </a:extLst>
-            </p:spPr>
-          </p:pic>
-          <p:cxnSp>
-            <p:nvCxnSpPr>
-              <p:cNvPr id="10" name="Straight Connector 9">
-                <a:extLst>
-                  <a:ext uri="{FF2B5EF4-FFF2-40B4-BE49-F238E27FC236}">
-                    <a16:creationId xmlns:a16="http://schemas.microsoft.com/office/drawing/2014/main" id="{151F53A0-B781-43B4-AACC-D3BE1BE8162D}"/>
-                  </a:ext>
-                </a:extLst>
-              </p:cNvPr>
-              <p:cNvCxnSpPr>
-                <a:cxnSpLocks/>
-              </p:cNvCxnSpPr>
-              <p:nvPr/>
-            </p:nvCxnSpPr>
-            <p:spPr>
-              <a:xfrm>
-                <a:off x="4119154" y="3437705"/>
-                <a:ext cx="4101737" cy="6533"/>
-              </a:xfrm>
-              <a:prstGeom prst="line">
-                <a:avLst/>
-              </a:prstGeom>
-              <a:ln w="57150">
-                <a:solidFill>
-                  <a:schemeClr val="bg1"/>
-                </a:solidFill>
-              </a:ln>
-            </p:spPr>
-            <p:style>
-              <a:lnRef idx="1">
-                <a:schemeClr val="accent1"/>
-              </a:lnRef>
-              <a:fillRef idx="0">
-                <a:schemeClr val="accent1"/>
-              </a:fillRef>
-              <a:effectRef idx="0">
-                <a:schemeClr val="accent1"/>
-              </a:effectRef>
-              <a:fontRef idx="minor">
-                <a:schemeClr val="tx1"/>
-              </a:fontRef>
-            </p:style>
-          </p:cxnSp>
-          <p:sp>
-            <p:nvSpPr>
-              <p:cNvPr id="11" name="Rectangle 10">
-                <a:extLst>
-                  <a:ext uri="{FF2B5EF4-FFF2-40B4-BE49-F238E27FC236}">
-                    <a16:creationId xmlns:a16="http://schemas.microsoft.com/office/drawing/2014/main" id="{1444ACC0-7BA2-455F-A151-B168A5EAF6AA}"/>
-                  </a:ext>
-                </a:extLst>
-              </p:cNvPr>
-              <p:cNvSpPr/>
+              <p:cNvSpPr txBox="1"/>
               <p:nvPr/>
             </p:nvSpPr>
             <p:spPr>
-              <a:xfrm>
-                <a:off x="4110445" y="3505201"/>
-                <a:ext cx="522515" cy="291727"/>
+              <a:xfrm rot="16200000">
+                <a:off x="2585896" y="3262189"/>
+                <a:ext cx="1667410" cy="307777"/>
               </a:xfrm>
               <a:prstGeom prst="rect">
                 <a:avLst/>
@@ -3672,315 +4051,88 @@
               <a:solidFill>
                 <a:schemeClr val="bg1"/>
               </a:solidFill>
-              <a:ln>
-                <a:solidFill>
-                  <a:schemeClr val="bg1"/>
-                </a:solidFill>
-              </a:ln>
             </p:spPr>
-            <p:style>
-              <a:lnRef idx="2">
-                <a:schemeClr val="accent1">
-                  <a:shade val="50000"/>
-                </a:schemeClr>
-              </a:lnRef>
-              <a:fillRef idx="1">
-                <a:schemeClr val="accent1"/>
-              </a:fillRef>
-              <a:effectRef idx="0">
-                <a:schemeClr val="accent1"/>
-              </a:effectRef>
-              <a:fontRef idx="minor">
-                <a:schemeClr val="lt1"/>
-              </a:fontRef>
-            </p:style>
             <p:txBody>
-              <a:bodyPr rtlCol="0" anchor="ctr"/>
+              <a:bodyPr wrap="square" rtlCol="0">
+                <a:spAutoFit/>
+              </a:bodyPr>
               <a:lstStyle/>
               <a:p>
-                <a:pPr algn="ctr"/>
-                <a:endParaRPr lang="en-GB"/>
+                <a:r>
+                  <a:rPr lang="en-GB" sz="1400" dirty="0">
+                    <a:solidFill>
+                      <a:schemeClr val="bg2">
+                        <a:lumMod val="25000"/>
+                      </a:schemeClr>
+                    </a:solidFill>
+                  </a:rPr>
+                  <a:t>8-bit Digital Input</a:t>
+                </a:r>
               </a:p>
             </p:txBody>
           </p:sp>
-          <p:sp>
-            <p:nvSpPr>
-              <p:cNvPr id="13" name="Rectangle 12">
-                <a:extLst>
-                  <a:ext uri="{FF2B5EF4-FFF2-40B4-BE49-F238E27FC236}">
-                    <a16:creationId xmlns:a16="http://schemas.microsoft.com/office/drawing/2014/main" id="{7CD759DA-C21A-49B3-A4A9-F6BE8AB2314F}"/>
-                  </a:ext>
-                </a:extLst>
-              </p:cNvPr>
-              <p:cNvSpPr/>
-              <p:nvPr/>
-            </p:nvSpPr>
-            <p:spPr>
-              <a:xfrm>
-                <a:off x="4767943" y="3435532"/>
-                <a:ext cx="522515" cy="291727"/>
-              </a:xfrm>
-              <a:prstGeom prst="rect">
-                <a:avLst/>
-              </a:prstGeom>
-              <a:solidFill>
-                <a:schemeClr val="bg1"/>
-              </a:solidFill>
-              <a:ln>
-                <a:solidFill>
-                  <a:schemeClr val="bg1"/>
-                </a:solidFill>
-              </a:ln>
-            </p:spPr>
-            <p:style>
-              <a:lnRef idx="2">
-                <a:schemeClr val="accent1">
-                  <a:shade val="50000"/>
-                </a:schemeClr>
-              </a:lnRef>
-              <a:fillRef idx="1">
-                <a:schemeClr val="accent1"/>
-              </a:fillRef>
-              <a:effectRef idx="0">
-                <a:schemeClr val="accent1"/>
-              </a:effectRef>
-              <a:fontRef idx="minor">
-                <a:schemeClr val="lt1"/>
-              </a:fontRef>
-            </p:style>
-            <p:txBody>
-              <a:bodyPr rtlCol="0" anchor="ctr"/>
-              <a:lstStyle/>
-              <a:p>
-                <a:pPr algn="ctr"/>
-                <a:endParaRPr lang="en-GB"/>
-              </a:p>
-            </p:txBody>
-          </p:sp>
-          <p:sp>
-            <p:nvSpPr>
-              <p:cNvPr id="14" name="Rectangle 13">
-                <a:extLst>
-                  <a:ext uri="{FF2B5EF4-FFF2-40B4-BE49-F238E27FC236}">
-                    <a16:creationId xmlns:a16="http://schemas.microsoft.com/office/drawing/2014/main" id="{C8E485B1-75D3-4FE0-8065-758DE1DEDE6D}"/>
-                  </a:ext>
-                </a:extLst>
-              </p:cNvPr>
-              <p:cNvSpPr/>
-              <p:nvPr/>
-            </p:nvSpPr>
-            <p:spPr>
-              <a:xfrm>
-                <a:off x="5756370" y="3496492"/>
-                <a:ext cx="522515" cy="291727"/>
-              </a:xfrm>
-              <a:prstGeom prst="rect">
-                <a:avLst/>
-              </a:prstGeom>
-              <a:solidFill>
-                <a:schemeClr val="bg1"/>
-              </a:solidFill>
-              <a:ln>
-                <a:solidFill>
-                  <a:schemeClr val="bg1"/>
-                </a:solidFill>
-              </a:ln>
-            </p:spPr>
-            <p:style>
-              <a:lnRef idx="2">
-                <a:schemeClr val="accent1">
-                  <a:shade val="50000"/>
-                </a:schemeClr>
-              </a:lnRef>
-              <a:fillRef idx="1">
-                <a:schemeClr val="accent1"/>
-              </a:fillRef>
-              <a:effectRef idx="0">
-                <a:schemeClr val="accent1"/>
-              </a:effectRef>
-              <a:fontRef idx="minor">
-                <a:schemeClr val="lt1"/>
-              </a:fontRef>
-            </p:style>
-            <p:txBody>
-              <a:bodyPr rtlCol="0" anchor="ctr"/>
-              <a:lstStyle/>
-              <a:p>
-                <a:pPr algn="ctr"/>
-                <a:endParaRPr lang="en-GB"/>
-              </a:p>
-            </p:txBody>
-          </p:sp>
-          <p:sp>
-            <p:nvSpPr>
-              <p:cNvPr id="15" name="Rectangle 14">
-                <a:extLst>
-                  <a:ext uri="{FF2B5EF4-FFF2-40B4-BE49-F238E27FC236}">
-                    <a16:creationId xmlns:a16="http://schemas.microsoft.com/office/drawing/2014/main" id="{05C08EDC-C57D-44DD-B1A7-EE11718AC77A}"/>
-                  </a:ext>
-                </a:extLst>
-              </p:cNvPr>
-              <p:cNvSpPr/>
-              <p:nvPr/>
-            </p:nvSpPr>
-            <p:spPr>
-              <a:xfrm>
-                <a:off x="6400802" y="3464281"/>
-                <a:ext cx="522515" cy="291727"/>
-              </a:xfrm>
-              <a:prstGeom prst="rect">
-                <a:avLst/>
-              </a:prstGeom>
-              <a:solidFill>
-                <a:schemeClr val="bg1"/>
-              </a:solidFill>
-              <a:ln>
-                <a:solidFill>
-                  <a:schemeClr val="bg1"/>
-                </a:solidFill>
-              </a:ln>
-            </p:spPr>
-            <p:style>
-              <a:lnRef idx="2">
-                <a:schemeClr val="accent1">
-                  <a:shade val="50000"/>
-                </a:schemeClr>
-              </a:lnRef>
-              <a:fillRef idx="1">
-                <a:schemeClr val="accent1"/>
-              </a:fillRef>
-              <a:effectRef idx="0">
-                <a:schemeClr val="accent1"/>
-              </a:effectRef>
-              <a:fontRef idx="minor">
-                <a:schemeClr val="lt1"/>
-              </a:fontRef>
-            </p:style>
-            <p:txBody>
-              <a:bodyPr rtlCol="0" anchor="ctr"/>
-              <a:lstStyle/>
-              <a:p>
-                <a:pPr algn="ctr"/>
-                <a:endParaRPr lang="en-GB"/>
-              </a:p>
-            </p:txBody>
-          </p:sp>
-          <p:sp>
-            <p:nvSpPr>
-              <p:cNvPr id="16" name="Rectangle 15">
-                <a:extLst>
-                  <a:ext uri="{FF2B5EF4-FFF2-40B4-BE49-F238E27FC236}">
-                    <a16:creationId xmlns:a16="http://schemas.microsoft.com/office/drawing/2014/main" id="{C9134C46-8FC3-4A74-AC9E-014948595F05}"/>
-                  </a:ext>
-                </a:extLst>
-              </p:cNvPr>
-              <p:cNvSpPr/>
-              <p:nvPr/>
-            </p:nvSpPr>
-            <p:spPr>
-              <a:xfrm>
-                <a:off x="7415352" y="3503464"/>
-                <a:ext cx="522515" cy="291727"/>
-              </a:xfrm>
-              <a:prstGeom prst="rect">
-                <a:avLst/>
-              </a:prstGeom>
-              <a:solidFill>
-                <a:schemeClr val="bg1"/>
-              </a:solidFill>
-              <a:ln>
-                <a:solidFill>
-                  <a:schemeClr val="bg1"/>
-                </a:solidFill>
-              </a:ln>
-            </p:spPr>
-            <p:style>
-              <a:lnRef idx="2">
-                <a:schemeClr val="accent1">
-                  <a:shade val="50000"/>
-                </a:schemeClr>
-              </a:lnRef>
-              <a:fillRef idx="1">
-                <a:schemeClr val="accent1"/>
-              </a:fillRef>
-              <a:effectRef idx="0">
-                <a:schemeClr val="accent1"/>
-              </a:effectRef>
-              <a:fontRef idx="minor">
-                <a:schemeClr val="lt1"/>
-              </a:fontRef>
-            </p:style>
-            <p:txBody>
-              <a:bodyPr rtlCol="0" anchor="ctr"/>
-              <a:lstStyle/>
-              <a:p>
-                <a:pPr algn="ctr"/>
-                <a:endParaRPr lang="en-GB"/>
-              </a:p>
-            </p:txBody>
-          </p:sp>
-          <p:pic>
-            <p:nvPicPr>
-              <p:cNvPr id="5" name="Picture 4">
-                <a:extLst>
-                  <a:ext uri="{FF2B5EF4-FFF2-40B4-BE49-F238E27FC236}">
-                    <a16:creationId xmlns:a16="http://schemas.microsoft.com/office/drawing/2014/main" id="{EE79E09A-1849-432A-A96D-BA47AE8D76C2}"/>
-                  </a:ext>
-                </a:extLst>
-              </p:cNvPr>
-              <p:cNvPicPr>
-                <a:picLocks noChangeAspect="1"/>
-              </p:cNvPicPr>
-              <p:nvPr/>
-            </p:nvPicPr>
-            <p:blipFill rotWithShape="1">
-              <a:blip r:embed="rId3">
-                <a:clrChange>
-                  <a:clrFrom>
-                    <a:srgbClr val="FFFFFF"/>
-                  </a:clrFrom>
-                  <a:clrTo>
-                    <a:srgbClr val="FFFFFF">
-                      <a:alpha val="0"/>
-                    </a:srgbClr>
-                  </a:clrTo>
-                </a:clrChange>
-                <a:extLst>
-                  <a:ext uri="{28A0092B-C50C-407E-A947-70E740481C1C}">
-                    <a14:useLocalDpi xmlns:a14="http://schemas.microsoft.com/office/drawing/2010/main" val="0"/>
-                  </a:ext>
-                </a:extLst>
-              </a:blip>
-              <a:srcRect l="3125" t="2877" r="9078"/>
-              <a:stretch/>
-            </p:blipFill>
-            <p:spPr>
-              <a:xfrm>
-                <a:off x="3357155" y="1567543"/>
-                <a:ext cx="5138051" cy="3836565"/>
-              </a:xfrm>
-              <a:prstGeom prst="rect">
-                <a:avLst/>
-              </a:prstGeom>
-            </p:spPr>
-          </p:pic>
         </p:grpSp>
-        <p:sp>
-          <p:nvSpPr>
-            <p:cNvPr id="2" name="TextBox 1">
+        <p:pic>
+          <p:nvPicPr>
+            <p:cNvPr id="18" name="Picture 17">
               <a:extLst>
                 <a:ext uri="{FF2B5EF4-FFF2-40B4-BE49-F238E27FC236}">
-                  <a16:creationId xmlns:a16="http://schemas.microsoft.com/office/drawing/2014/main" id="{E7807BD8-9D4C-4860-B879-3701AC664545}"/>
+                  <a16:creationId xmlns:a16="http://schemas.microsoft.com/office/drawing/2014/main" id="{FF072761-4323-401B-AF58-75A5EE2EA494}"/>
                 </a:ext>
               </a:extLst>
             </p:cNvPr>
-            <p:cNvSpPr txBox="1"/>
+            <p:cNvPicPr>
+              <a:picLocks noChangeAspect="1"/>
+            </p:cNvPicPr>
+            <p:nvPr/>
+          </p:nvPicPr>
+          <p:blipFill rotWithShape="1">
+            <a:blip r:embed="rId3">
+              <a:clrChange>
+                <a:clrFrom>
+                  <a:srgbClr val="FFFFFF"/>
+                </a:clrFrom>
+                <a:clrTo>
+                  <a:srgbClr val="FFFFFF">
+                    <a:alpha val="0"/>
+                  </a:srgbClr>
+                </a:clrTo>
+              </a:clrChange>
+              <a:extLst>
+                <a:ext uri="{28A0092B-C50C-407E-A947-70E740481C1C}">
+                  <a14:useLocalDpi xmlns:a14="http://schemas.microsoft.com/office/drawing/2010/main" val="0"/>
+                </a:ext>
+              </a:extLst>
+            </a:blip>
+            <a:srcRect l="45248" t="13624" r="50298" b="69853"/>
+            <a:stretch/>
+          </p:blipFill>
+          <p:spPr>
+            <a:xfrm rot="10800000">
+              <a:off x="4825107" y="4250008"/>
+              <a:ext cx="260700" cy="652681"/>
+            </a:xfrm>
+            <a:prstGeom prst="rect">
+              <a:avLst/>
+            </a:prstGeom>
+          </p:spPr>
+        </p:pic>
+        <p:sp>
+          <p:nvSpPr>
+            <p:cNvPr id="4" name="Rectangle 3">
+              <a:extLst>
+                <a:ext uri="{FF2B5EF4-FFF2-40B4-BE49-F238E27FC236}">
+                  <a16:creationId xmlns:a16="http://schemas.microsoft.com/office/drawing/2014/main" id="{70847FE3-08A8-4B54-9F9E-F050D884DBAD}"/>
+                </a:ext>
+              </a:extLst>
+            </p:cNvPr>
+            <p:cNvSpPr/>
             <p:nvPr/>
           </p:nvSpPr>
           <p:spPr>
             <a:xfrm>
-              <a:off x="5331825" y="5173859"/>
-              <a:ext cx="1528350" cy="307777"/>
+              <a:off x="4872445" y="3417663"/>
+              <a:ext cx="208445" cy="1026882"/>
             </a:xfrm>
             <a:prstGeom prst="rect">
               <a:avLst/>
@@ -3988,42 +4140,53 @@
             <a:solidFill>
               <a:schemeClr val="bg1"/>
             </a:solidFill>
+            <a:ln>
+              <a:solidFill>
+                <a:schemeClr val="bg1"/>
+              </a:solidFill>
+            </a:ln>
           </p:spPr>
+          <p:style>
+            <a:lnRef idx="2">
+              <a:schemeClr val="accent1">
+                <a:shade val="50000"/>
+              </a:schemeClr>
+            </a:lnRef>
+            <a:fillRef idx="1">
+              <a:schemeClr val="accent1"/>
+            </a:fillRef>
+            <a:effectRef idx="0">
+              <a:schemeClr val="accent1"/>
+            </a:effectRef>
+            <a:fontRef idx="minor">
+              <a:schemeClr val="lt1"/>
+            </a:fontRef>
+          </p:style>
           <p:txBody>
-            <a:bodyPr wrap="square" rtlCol="0">
-              <a:spAutoFit/>
-            </a:bodyPr>
+            <a:bodyPr rtlCol="0" anchor="ctr"/>
             <a:lstStyle/>
             <a:p>
-              <a:r>
-                <a:rPr lang="en-GB" sz="1400" dirty="0">
-                  <a:solidFill>
-                    <a:schemeClr val="bg2">
-                      <a:lumMod val="25000"/>
-                    </a:schemeClr>
-                  </a:solidFill>
-                </a:rPr>
-                <a:t>Time (samples)</a:t>
-              </a:r>
+              <a:pPr algn="ctr"/>
+              <a:endParaRPr lang="en-GB"/>
             </a:p>
           </p:txBody>
         </p:sp>
         <p:sp>
           <p:nvSpPr>
-            <p:cNvPr id="17" name="TextBox 16">
+            <p:cNvPr id="19" name="Rectangle 18">
               <a:extLst>
                 <a:ext uri="{FF2B5EF4-FFF2-40B4-BE49-F238E27FC236}">
-                  <a16:creationId xmlns:a16="http://schemas.microsoft.com/office/drawing/2014/main" id="{28CE9633-2247-4082-97FA-AEA0FF66AE46}"/>
+                  <a16:creationId xmlns:a16="http://schemas.microsoft.com/office/drawing/2014/main" id="{EB2ECCB0-7B64-450B-9FEE-006064C0B903}"/>
                 </a:ext>
               </a:extLst>
             </p:cNvPr>
-            <p:cNvSpPr txBox="1"/>
+            <p:cNvSpPr/>
             <p:nvPr/>
           </p:nvSpPr>
           <p:spPr>
-            <a:xfrm rot="16200000">
-              <a:off x="2585896" y="3262189"/>
-              <a:ext cx="1667410" cy="307777"/>
+            <a:xfrm rot="20615058">
+              <a:off x="4882071" y="4402401"/>
+              <a:ext cx="141855" cy="197940"/>
             </a:xfrm>
             <a:prstGeom prst="rect">
               <a:avLst/>
@@ -4031,26 +4194,343 @@
             <a:solidFill>
               <a:schemeClr val="bg1"/>
             </a:solidFill>
+            <a:ln>
+              <a:solidFill>
+                <a:schemeClr val="bg1"/>
+              </a:solidFill>
+            </a:ln>
           </p:spPr>
+          <p:style>
+            <a:lnRef idx="2">
+              <a:schemeClr val="accent1">
+                <a:shade val="50000"/>
+              </a:schemeClr>
+            </a:lnRef>
+            <a:fillRef idx="1">
+              <a:schemeClr val="accent1"/>
+            </a:fillRef>
+            <a:effectRef idx="0">
+              <a:schemeClr val="accent1"/>
+            </a:effectRef>
+            <a:fontRef idx="minor">
+              <a:schemeClr val="lt1"/>
+            </a:fontRef>
+          </p:style>
           <p:txBody>
-            <a:bodyPr wrap="square" rtlCol="0">
-              <a:spAutoFit/>
-            </a:bodyPr>
+            <a:bodyPr rtlCol="0" anchor="ctr"/>
             <a:lstStyle/>
             <a:p>
-              <a:r>
-                <a:rPr lang="en-GB" sz="1400" dirty="0">
-                  <a:solidFill>
-                    <a:schemeClr val="bg2">
-                      <a:lumMod val="25000"/>
-                    </a:schemeClr>
-                  </a:solidFill>
-                </a:rPr>
-                <a:t>Magnitude (digital)</a:t>
-              </a:r>
+              <a:pPr algn="ctr"/>
+              <a:endParaRPr lang="en-GB"/>
             </a:p>
           </p:txBody>
         </p:sp>
+        <p:sp>
+          <p:nvSpPr>
+            <p:cNvPr id="20" name="Rectangle 19">
+              <a:extLst>
+                <a:ext uri="{FF2B5EF4-FFF2-40B4-BE49-F238E27FC236}">
+                  <a16:creationId xmlns:a16="http://schemas.microsoft.com/office/drawing/2014/main" id="{24E01681-B903-408E-8ED8-D59C5B223EF9}"/>
+                </a:ext>
+              </a:extLst>
+            </p:cNvPr>
+            <p:cNvSpPr/>
+            <p:nvPr/>
+          </p:nvSpPr>
+          <p:spPr>
+            <a:xfrm rot="20615058">
+              <a:off x="4705511" y="4491970"/>
+              <a:ext cx="141855" cy="197940"/>
+            </a:xfrm>
+            <a:prstGeom prst="rect">
+              <a:avLst/>
+            </a:prstGeom>
+            <a:solidFill>
+              <a:schemeClr val="bg1"/>
+            </a:solidFill>
+            <a:ln>
+              <a:solidFill>
+                <a:schemeClr val="bg1"/>
+              </a:solidFill>
+            </a:ln>
+          </p:spPr>
+          <p:style>
+            <a:lnRef idx="2">
+              <a:schemeClr val="accent1">
+                <a:shade val="50000"/>
+              </a:schemeClr>
+            </a:lnRef>
+            <a:fillRef idx="1">
+              <a:schemeClr val="accent1"/>
+            </a:fillRef>
+            <a:effectRef idx="0">
+              <a:schemeClr val="accent1"/>
+            </a:effectRef>
+            <a:fontRef idx="minor">
+              <a:schemeClr val="lt1"/>
+            </a:fontRef>
+          </p:style>
+          <p:txBody>
+            <a:bodyPr rtlCol="0" anchor="ctr"/>
+            <a:lstStyle/>
+            <a:p>
+              <a:pPr algn="ctr"/>
+              <a:endParaRPr lang="en-GB"/>
+            </a:p>
+          </p:txBody>
+        </p:sp>
+        <p:sp>
+          <p:nvSpPr>
+            <p:cNvPr id="21" name="Rectangle 20">
+              <a:extLst>
+                <a:ext uri="{FF2B5EF4-FFF2-40B4-BE49-F238E27FC236}">
+                  <a16:creationId xmlns:a16="http://schemas.microsoft.com/office/drawing/2014/main" id="{CAD5E95A-BB71-4B06-9FFB-081C5D42FDA3}"/>
+                </a:ext>
+              </a:extLst>
+            </p:cNvPr>
+            <p:cNvSpPr/>
+            <p:nvPr/>
+          </p:nvSpPr>
+          <p:spPr>
+            <a:xfrm rot="19817270">
+              <a:off x="4771442" y="4648958"/>
+              <a:ext cx="141855" cy="197940"/>
+            </a:xfrm>
+            <a:prstGeom prst="rect">
+              <a:avLst/>
+            </a:prstGeom>
+            <a:solidFill>
+              <a:schemeClr val="bg1"/>
+            </a:solidFill>
+            <a:ln>
+              <a:solidFill>
+                <a:schemeClr val="bg1"/>
+              </a:solidFill>
+            </a:ln>
+          </p:spPr>
+          <p:style>
+            <a:lnRef idx="2">
+              <a:schemeClr val="accent1">
+                <a:shade val="50000"/>
+              </a:schemeClr>
+            </a:lnRef>
+            <a:fillRef idx="1">
+              <a:schemeClr val="accent1"/>
+            </a:fillRef>
+            <a:effectRef idx="0">
+              <a:schemeClr val="accent1"/>
+            </a:effectRef>
+            <a:fontRef idx="minor">
+              <a:schemeClr val="lt1"/>
+            </a:fontRef>
+          </p:style>
+          <p:txBody>
+            <a:bodyPr rtlCol="0" anchor="ctr"/>
+            <a:lstStyle/>
+            <a:p>
+              <a:pPr algn="ctr"/>
+              <a:endParaRPr lang="en-GB"/>
+            </a:p>
+          </p:txBody>
+        </p:sp>
+        <p:sp>
+          <p:nvSpPr>
+            <p:cNvPr id="22" name="Rectangle 21">
+              <a:extLst>
+                <a:ext uri="{FF2B5EF4-FFF2-40B4-BE49-F238E27FC236}">
+                  <a16:creationId xmlns:a16="http://schemas.microsoft.com/office/drawing/2014/main" id="{75A5814C-9A6C-4810-9972-0BC71B097A88}"/>
+                </a:ext>
+              </a:extLst>
+            </p:cNvPr>
+            <p:cNvSpPr/>
+            <p:nvPr/>
+          </p:nvSpPr>
+          <p:spPr>
+            <a:xfrm>
+              <a:off x="5017119" y="3783368"/>
+              <a:ext cx="62962" cy="1026882"/>
+            </a:xfrm>
+            <a:prstGeom prst="rect">
+              <a:avLst/>
+            </a:prstGeom>
+            <a:solidFill>
+              <a:schemeClr val="bg1"/>
+            </a:solidFill>
+            <a:ln>
+              <a:solidFill>
+                <a:schemeClr val="bg1"/>
+              </a:solidFill>
+            </a:ln>
+          </p:spPr>
+          <p:style>
+            <a:lnRef idx="2">
+              <a:schemeClr val="accent1">
+                <a:shade val="50000"/>
+              </a:schemeClr>
+            </a:lnRef>
+            <a:fillRef idx="1">
+              <a:schemeClr val="accent1"/>
+            </a:fillRef>
+            <a:effectRef idx="0">
+              <a:schemeClr val="accent1"/>
+            </a:effectRef>
+            <a:fontRef idx="minor">
+              <a:schemeClr val="lt1"/>
+            </a:fontRef>
+          </p:style>
+          <p:txBody>
+            <a:bodyPr rtlCol="0" anchor="ctr"/>
+            <a:lstStyle/>
+            <a:p>
+              <a:pPr algn="ctr"/>
+              <a:endParaRPr lang="en-GB"/>
+            </a:p>
+          </p:txBody>
+        </p:sp>
+        <p:pic>
+          <p:nvPicPr>
+            <p:cNvPr id="25" name="Picture 24">
+              <a:extLst>
+                <a:ext uri="{FF2B5EF4-FFF2-40B4-BE49-F238E27FC236}">
+                  <a16:creationId xmlns:a16="http://schemas.microsoft.com/office/drawing/2014/main" id="{19CD10BB-BE50-4358-9DEC-7E35165AD19C}"/>
+                </a:ext>
+              </a:extLst>
+            </p:cNvPr>
+            <p:cNvPicPr>
+              <a:picLocks noChangeAspect="1"/>
+            </p:cNvPicPr>
+            <p:nvPr/>
+          </p:nvPicPr>
+          <p:blipFill rotWithShape="1">
+            <a:blip r:embed="rId3">
+              <a:clrChange>
+                <a:clrFrom>
+                  <a:srgbClr val="FFFFFF"/>
+                </a:clrFrom>
+                <a:clrTo>
+                  <a:srgbClr val="FFFFFF">
+                    <a:alpha val="0"/>
+                  </a:srgbClr>
+                </a:clrTo>
+              </a:clrChange>
+              <a:extLst>
+                <a:ext uri="{28A0092B-C50C-407E-A947-70E740481C1C}">
+                  <a14:useLocalDpi xmlns:a14="http://schemas.microsoft.com/office/drawing/2010/main" val="0"/>
+                </a:ext>
+              </a:extLst>
+            </a:blip>
+            <a:srcRect l="46561" t="13746" r="50631" b="74269"/>
+            <a:stretch/>
+          </p:blipFill>
+          <p:spPr>
+            <a:xfrm>
+              <a:off x="7551744" y="1993995"/>
+              <a:ext cx="164314" cy="473426"/>
+            </a:xfrm>
+            <a:prstGeom prst="rect">
+              <a:avLst/>
+            </a:prstGeom>
+          </p:spPr>
+        </p:pic>
+        <p:sp>
+          <p:nvSpPr>
+            <p:cNvPr id="26" name="Rectangle 25">
+              <a:extLst>
+                <a:ext uri="{FF2B5EF4-FFF2-40B4-BE49-F238E27FC236}">
+                  <a16:creationId xmlns:a16="http://schemas.microsoft.com/office/drawing/2014/main" id="{74C3B88C-BEFB-4EF2-BE23-591BECFB7C37}"/>
+                </a:ext>
+              </a:extLst>
+            </p:cNvPr>
+            <p:cNvSpPr/>
+            <p:nvPr/>
+          </p:nvSpPr>
+          <p:spPr>
+            <a:xfrm>
+              <a:off x="7602155" y="2904436"/>
+              <a:ext cx="248630" cy="1026882"/>
+            </a:xfrm>
+            <a:prstGeom prst="rect">
+              <a:avLst/>
+            </a:prstGeom>
+            <a:solidFill>
+              <a:schemeClr val="bg1"/>
+            </a:solidFill>
+            <a:ln>
+              <a:solidFill>
+                <a:schemeClr val="bg1"/>
+              </a:solidFill>
+            </a:ln>
+          </p:spPr>
+          <p:style>
+            <a:lnRef idx="2">
+              <a:schemeClr val="accent1">
+                <a:shade val="50000"/>
+              </a:schemeClr>
+            </a:lnRef>
+            <a:fillRef idx="1">
+              <a:schemeClr val="accent1"/>
+            </a:fillRef>
+            <a:effectRef idx="0">
+              <a:schemeClr val="accent1"/>
+            </a:effectRef>
+            <a:fontRef idx="minor">
+              <a:schemeClr val="lt1"/>
+            </a:fontRef>
+          </p:style>
+          <p:txBody>
+            <a:bodyPr rtlCol="0" anchor="ctr"/>
+            <a:lstStyle/>
+            <a:p>
+              <a:pPr algn="ctr"/>
+              <a:endParaRPr lang="en-GB"/>
+            </a:p>
+          </p:txBody>
+        </p:sp>
+        <p:pic>
+          <p:nvPicPr>
+            <p:cNvPr id="23" name="Picture 22">
+              <a:extLst>
+                <a:ext uri="{FF2B5EF4-FFF2-40B4-BE49-F238E27FC236}">
+                  <a16:creationId xmlns:a16="http://schemas.microsoft.com/office/drawing/2014/main" id="{E6EF6E85-212E-41FA-B538-00472A69DCA4}"/>
+                </a:ext>
+              </a:extLst>
+            </p:cNvPr>
+            <p:cNvPicPr>
+              <a:picLocks noChangeAspect="1"/>
+            </p:cNvPicPr>
+            <p:nvPr/>
+          </p:nvPicPr>
+          <p:blipFill rotWithShape="1">
+            <a:blip r:embed="rId3">
+              <a:clrChange>
+                <a:clrFrom>
+                  <a:srgbClr val="FFFFFF"/>
+                </a:clrFrom>
+                <a:clrTo>
+                  <a:srgbClr val="FFFFFF">
+                    <a:alpha val="0"/>
+                  </a:srgbClr>
+                </a:clrTo>
+              </a:clrChange>
+              <a:extLst>
+                <a:ext uri="{28A0092B-C50C-407E-A947-70E740481C1C}">
+                  <a14:useLocalDpi xmlns:a14="http://schemas.microsoft.com/office/drawing/2010/main" val="0"/>
+                </a:ext>
+              </a:extLst>
+            </a:blip>
+            <a:srcRect l="24793" t="49489" r="71591" b="22429"/>
+            <a:stretch/>
+          </p:blipFill>
+          <p:spPr>
+            <a:xfrm rot="10800000">
+              <a:off x="7702308" y="2300181"/>
+              <a:ext cx="211571" cy="1109276"/>
+            </a:xfrm>
+            <a:prstGeom prst="rect">
+              <a:avLst/>
+            </a:prstGeom>
+          </p:spPr>
+        </p:pic>
       </p:grpSp>
     </p:spTree>
     <p:extLst>

</xml_diff>